<commit_message>
Allocate existing global address 유닛테스트 추가
</commit_message>
<xml_diff>
--- a/DsDotNet/src/UnitTest/UnitTest.Model/ImportOfficeExample/Sample/s.pptx
+++ b/DsDotNet/src/UnitTest/UnitTest.Model/ImportOfficeExample/Sample/s.pptx
@@ -232,7 +232,7 @@
           <a:p>
             <a:fld id="{DD503887-5801-43A0-AEF9-041E8DDC2558}" type="datetimeFigureOut">
               <a:rPr lang="ko-KR" altLang="en-US" smtClean="0"/>
-              <a:t>2023-03-27</a:t>
+              <a:t>2023-03-28</a:t>
             </a:fld>
             <a:endParaRPr lang="ko-KR" altLang="en-US" dirty="0"/>
           </a:p>
@@ -409,7 +409,7 @@
           <a:p>
             <a:fld id="{95336A0E-57B1-4D4C-BD9B-2F72B5943464}" type="datetimeFigureOut">
               <a:rPr lang="ko-KR" altLang="en-US" smtClean="0"/>
-              <a:t>2023-03-27</a:t>
+              <a:t>2023-03-28</a:t>
             </a:fld>
             <a:endParaRPr lang="ko-KR" altLang="en-US" dirty="0"/>
           </a:p>
@@ -907,7 +907,7 @@
           <a:p>
             <a:fld id="{229D12C7-0FF5-4972-A033-474EFFC79F40}" type="datetime1">
               <a:rPr lang="ko-KR" altLang="en-US" smtClean="0"/>
-              <a:t>2023-03-27</a:t>
+              <a:t>2023-03-28</a:t>
             </a:fld>
             <a:endParaRPr lang="ko-KR" altLang="en-US" dirty="0"/>
           </a:p>
@@ -1105,7 +1105,7 @@
           <a:p>
             <a:fld id="{5BA19FD4-B052-4F56-8FD8-EAFD078DEFB0}" type="datetime1">
               <a:rPr lang="ko-KR" altLang="en-US" smtClean="0"/>
-              <a:t>2023-03-27</a:t>
+              <a:t>2023-03-28</a:t>
             </a:fld>
             <a:endParaRPr lang="ko-KR" altLang="en-US" dirty="0"/>
           </a:p>
@@ -1313,7 +1313,7 @@
           <a:p>
             <a:fld id="{024994B9-23A6-4B0A-A038-AC140E83DAA3}" type="datetime1">
               <a:rPr lang="ko-KR" altLang="en-US" smtClean="0"/>
-              <a:t>2023-03-27</a:t>
+              <a:t>2023-03-28</a:t>
             </a:fld>
             <a:endParaRPr lang="ko-KR" altLang="en-US" dirty="0"/>
           </a:p>
@@ -1455,7 +1455,7 @@
           <a:p>
             <a:fld id="{B5B1BBC2-B738-4C35-AEE5-660EB2DEB482}" type="datetime1">
               <a:rPr lang="ko-KR" altLang="en-US" smtClean="0"/>
-              <a:t>2023-03-27</a:t>
+              <a:t>2023-03-28</a:t>
             </a:fld>
             <a:endParaRPr lang="ko-KR" altLang="en-US" dirty="0"/>
           </a:p>
@@ -6122,7 +6122,7 @@
           <a:p>
             <a:fld id="{70D0DAB2-87CB-4028-B965-3AA710ADF2CB}" type="datetime1">
               <a:rPr lang="ko-KR" altLang="en-US" smtClean="0"/>
-              <a:t>2023-03-27</a:t>
+              <a:t>2023-03-28</a:t>
             </a:fld>
             <a:endParaRPr lang="ko-KR" altLang="en-US" dirty="0"/>
           </a:p>
@@ -6397,7 +6397,7 @@
           <a:p>
             <a:fld id="{63FA3D71-FEA8-477F-9D1E-EA860F411BC7}" type="datetime1">
               <a:rPr lang="ko-KR" altLang="en-US" smtClean="0"/>
-              <a:t>2023-03-27</a:t>
+              <a:t>2023-03-28</a:t>
             </a:fld>
             <a:endParaRPr lang="ko-KR" altLang="en-US" dirty="0"/>
           </a:p>
@@ -6662,7 +6662,7 @@
           <a:p>
             <a:fld id="{F58E3EF4-7980-4C97-BA64-EC66995BB574}" type="datetime1">
               <a:rPr lang="ko-KR" altLang="en-US" smtClean="0"/>
-              <a:t>2023-03-27</a:t>
+              <a:t>2023-03-28</a:t>
             </a:fld>
             <a:endParaRPr lang="ko-KR" altLang="en-US" dirty="0"/>
           </a:p>
@@ -7074,7 +7074,7 @@
           <a:p>
             <a:fld id="{FC9BC1D0-7D6B-4634-9D19-644040D74EAE}" type="datetime1">
               <a:rPr lang="ko-KR" altLang="en-US" smtClean="0"/>
-              <a:t>2023-03-27</a:t>
+              <a:t>2023-03-28</a:t>
             </a:fld>
             <a:endParaRPr lang="ko-KR" altLang="en-US" dirty="0"/>
           </a:p>
@@ -7215,7 +7215,7 @@
           <a:p>
             <a:fld id="{B5B1BBC2-B738-4C35-AEE5-660EB2DEB482}" type="datetime1">
               <a:rPr lang="ko-KR" altLang="en-US" smtClean="0"/>
-              <a:t>2023-03-27</a:t>
+              <a:t>2023-03-28</a:t>
             </a:fld>
             <a:endParaRPr lang="ko-KR" altLang="en-US" dirty="0"/>
           </a:p>
@@ -11797,7 +11797,7 @@
           <a:p>
             <a:fld id="{C60E9F93-7E77-4F36-B88C-A425F00C8D91}" type="datetime1">
               <a:rPr lang="ko-KR" altLang="en-US" smtClean="0"/>
-              <a:t>2023-03-27</a:t>
+              <a:t>2023-03-28</a:t>
             </a:fld>
             <a:endParaRPr lang="ko-KR" altLang="en-US" dirty="0"/>
           </a:p>
@@ -12108,7 +12108,7 @@
           <a:p>
             <a:fld id="{36BCCD0E-2A54-4016-BFFC-FEAABCDA6915}" type="datetime1">
               <a:rPr lang="ko-KR" altLang="en-US" smtClean="0"/>
-              <a:t>2023-03-27</a:t>
+              <a:t>2023-03-28</a:t>
             </a:fld>
             <a:endParaRPr lang="ko-KR" altLang="en-US" dirty="0"/>
           </a:p>
@@ -12396,7 +12396,7 @@
           <a:p>
             <a:fld id="{C984B0C4-64BA-4E4C-B5E6-A51EE3F6ED95}" type="datetime1">
               <a:rPr lang="ko-KR" altLang="en-US" smtClean="0"/>
-              <a:t>2023-03-27</a:t>
+              <a:t>2023-03-28</a:t>
             </a:fld>
             <a:endParaRPr lang="ko-KR" altLang="en-US" dirty="0"/>
           </a:p>
@@ -12638,7 +12638,7 @@
           <a:p>
             <a:fld id="{C984B0C4-64BA-4E4C-B5E6-A51EE3F6ED95}" type="datetime1">
               <a:rPr lang="ko-KR" altLang="en-US" smtClean="0"/>
-              <a:t>2023-03-27</a:t>
+              <a:t>2023-03-28</a:t>
             </a:fld>
             <a:endParaRPr lang="ko-KR" altLang="en-US" dirty="0"/>
           </a:p>
@@ -13129,7 +13129,7 @@
 </file>
 
 <file path=ppt/slides/slide10.xml><?xml version="1.0" encoding="utf-8"?>
-<p:sld xmlns:a="http://schemas.openxmlformats.org/drawingml/2006/main" xmlns:r="http://schemas.openxmlformats.org/officeDocument/2006/relationships" xmlns:p="http://schemas.openxmlformats.org/presentationml/2006/main">
+<p:sld xmlns:a="http://schemas.openxmlformats.org/drawingml/2006/main" xmlns:r="http://schemas.openxmlformats.org/officeDocument/2006/relationships" xmlns:p="http://schemas.openxmlformats.org/presentationml/2006/main" show="0">
   <p:cSld>
     <p:spTree>
       <p:nvGrpSpPr>
@@ -13674,7 +13674,7 @@
 </file>
 
 <file path=ppt/slides/slide11.xml><?xml version="1.0" encoding="utf-8"?>
-<p:sld xmlns:a="http://schemas.openxmlformats.org/drawingml/2006/main" xmlns:r="http://schemas.openxmlformats.org/officeDocument/2006/relationships" xmlns:p="http://schemas.openxmlformats.org/presentationml/2006/main">
+<p:sld xmlns:a="http://schemas.openxmlformats.org/drawingml/2006/main" xmlns:r="http://schemas.openxmlformats.org/officeDocument/2006/relationships" xmlns:p="http://schemas.openxmlformats.org/presentationml/2006/main" show="0">
   <p:cSld>
     <p:spTree>
       <p:nvGrpSpPr>
@@ -14253,7 +14253,7 @@
 </file>
 
 <file path=ppt/slides/slide12.xml><?xml version="1.0" encoding="utf-8"?>
-<p:sld xmlns:a="http://schemas.openxmlformats.org/drawingml/2006/main" xmlns:r="http://schemas.openxmlformats.org/officeDocument/2006/relationships" xmlns:p="http://schemas.openxmlformats.org/presentationml/2006/main">
+<p:sld xmlns:a="http://schemas.openxmlformats.org/drawingml/2006/main" xmlns:r="http://schemas.openxmlformats.org/officeDocument/2006/relationships" xmlns:p="http://schemas.openxmlformats.org/presentationml/2006/main" show="0">
   <p:cSld>
     <p:spTree>
       <p:nvGrpSpPr>
@@ -14789,7 +14789,7 @@
 </file>
 
 <file path=ppt/slides/slide13.xml><?xml version="1.0" encoding="utf-8"?>
-<p:sld xmlns:a="http://schemas.openxmlformats.org/drawingml/2006/main" xmlns:r="http://schemas.openxmlformats.org/officeDocument/2006/relationships" xmlns:p="http://schemas.openxmlformats.org/presentationml/2006/main">
+<p:sld xmlns:a="http://schemas.openxmlformats.org/drawingml/2006/main" xmlns:r="http://schemas.openxmlformats.org/officeDocument/2006/relationships" xmlns:p="http://schemas.openxmlformats.org/presentationml/2006/main" show="0">
   <p:cSld>
     <p:spTree>
       <p:nvGrpSpPr>
@@ -15836,7 +15836,7 @@
 </file>
 
 <file path=ppt/slides/slide14.xml><?xml version="1.0" encoding="utf-8"?>
-<p:sld xmlns:a="http://schemas.openxmlformats.org/drawingml/2006/main" xmlns:r="http://schemas.openxmlformats.org/officeDocument/2006/relationships" xmlns:p="http://schemas.openxmlformats.org/presentationml/2006/main">
+<p:sld xmlns:a="http://schemas.openxmlformats.org/drawingml/2006/main" xmlns:r="http://schemas.openxmlformats.org/officeDocument/2006/relationships" xmlns:p="http://schemas.openxmlformats.org/presentationml/2006/main" show="0">
   <p:cSld>
     <p:spTree>
       <p:nvGrpSpPr>
@@ -16647,7 +16647,7 @@
 </file>
 
 <file path=ppt/slides/slide15.xml><?xml version="1.0" encoding="utf-8"?>
-<p:sld xmlns:a="http://schemas.openxmlformats.org/drawingml/2006/main" xmlns:r="http://schemas.openxmlformats.org/officeDocument/2006/relationships" xmlns:p="http://schemas.openxmlformats.org/presentationml/2006/main">
+<p:sld xmlns:a="http://schemas.openxmlformats.org/drawingml/2006/main" xmlns:r="http://schemas.openxmlformats.org/officeDocument/2006/relationships" xmlns:p="http://schemas.openxmlformats.org/presentationml/2006/main" show="0">
   <p:cSld>
     <p:spTree>
       <p:nvGrpSpPr>
@@ -17152,7 +17152,7 @@
 </file>
 
 <file path=ppt/slides/slide16.xml><?xml version="1.0" encoding="utf-8"?>
-<p:sld xmlns:a="http://schemas.openxmlformats.org/drawingml/2006/main" xmlns:r="http://schemas.openxmlformats.org/officeDocument/2006/relationships" xmlns:p="http://schemas.openxmlformats.org/presentationml/2006/main">
+<p:sld xmlns:a="http://schemas.openxmlformats.org/drawingml/2006/main" xmlns:r="http://schemas.openxmlformats.org/officeDocument/2006/relationships" xmlns:p="http://schemas.openxmlformats.org/presentationml/2006/main" show="0">
   <p:cSld>
     <p:spTree>
       <p:nvGrpSpPr>
@@ -17507,7 +17507,7 @@
 </file>
 
 <file path=ppt/slides/slide17.xml><?xml version="1.0" encoding="utf-8"?>
-<p:sld xmlns:a="http://schemas.openxmlformats.org/drawingml/2006/main" xmlns:r="http://schemas.openxmlformats.org/officeDocument/2006/relationships" xmlns:p="http://schemas.openxmlformats.org/presentationml/2006/main">
+<p:sld xmlns:a="http://schemas.openxmlformats.org/drawingml/2006/main" xmlns:r="http://schemas.openxmlformats.org/officeDocument/2006/relationships" xmlns:p="http://schemas.openxmlformats.org/presentationml/2006/main" show="0">
   <p:cSld>
     <p:spTree>
       <p:nvGrpSpPr>
@@ -17862,7 +17862,7 @@
 </file>
 
 <file path=ppt/slides/slide18.xml><?xml version="1.0" encoding="utf-8"?>
-<p:sld xmlns:a="http://schemas.openxmlformats.org/drawingml/2006/main" xmlns:r="http://schemas.openxmlformats.org/officeDocument/2006/relationships" xmlns:p="http://schemas.openxmlformats.org/presentationml/2006/main">
+<p:sld xmlns:a="http://schemas.openxmlformats.org/drawingml/2006/main" xmlns:r="http://schemas.openxmlformats.org/officeDocument/2006/relationships" xmlns:p="http://schemas.openxmlformats.org/presentationml/2006/main" show="0">
   <p:cSld>
     <p:spTree>
       <p:nvGrpSpPr>
@@ -18851,7 +18851,7 @@
 </file>
 
 <file path=ppt/slides/slide3.xml><?xml version="1.0" encoding="utf-8"?>
-<p:sld xmlns:a="http://schemas.openxmlformats.org/drawingml/2006/main" xmlns:r="http://schemas.openxmlformats.org/officeDocument/2006/relationships" xmlns:p="http://schemas.openxmlformats.org/presentationml/2006/main">
+<p:sld xmlns:a="http://schemas.openxmlformats.org/drawingml/2006/main" xmlns:r="http://schemas.openxmlformats.org/officeDocument/2006/relationships" xmlns:p="http://schemas.openxmlformats.org/presentationml/2006/main" show="0">
   <p:cSld>
     <p:spTree>
       <p:nvGrpSpPr>
@@ -19040,7 +19040,7 @@
 </file>
 
 <file path=ppt/slides/slide4.xml><?xml version="1.0" encoding="utf-8"?>
-<p:sld xmlns:a="http://schemas.openxmlformats.org/drawingml/2006/main" xmlns:r="http://schemas.openxmlformats.org/officeDocument/2006/relationships" xmlns:p="http://schemas.openxmlformats.org/presentationml/2006/main">
+<p:sld xmlns:a="http://schemas.openxmlformats.org/drawingml/2006/main" xmlns:r="http://schemas.openxmlformats.org/officeDocument/2006/relationships" xmlns:p="http://schemas.openxmlformats.org/presentationml/2006/main" show="0">
   <p:cSld>
     <p:spTree>
       <p:nvGrpSpPr>
@@ -19473,7 +19473,7 @@
 </file>
 
 <file path=ppt/slides/slide5.xml><?xml version="1.0" encoding="utf-8"?>
-<p:sld xmlns:a="http://schemas.openxmlformats.org/drawingml/2006/main" xmlns:r="http://schemas.openxmlformats.org/officeDocument/2006/relationships" xmlns:p="http://schemas.openxmlformats.org/presentationml/2006/main">
+<p:sld xmlns:a="http://schemas.openxmlformats.org/drawingml/2006/main" xmlns:r="http://schemas.openxmlformats.org/officeDocument/2006/relationships" xmlns:p="http://schemas.openxmlformats.org/presentationml/2006/main" show="0">
   <p:cSld>
     <p:spTree>
       <p:nvGrpSpPr>
@@ -20664,7 +20664,7 @@
 </file>
 
 <file path=ppt/slides/slide6.xml><?xml version="1.0" encoding="utf-8"?>
-<p:sld xmlns:a="http://schemas.openxmlformats.org/drawingml/2006/main" xmlns:r="http://schemas.openxmlformats.org/officeDocument/2006/relationships" xmlns:p="http://schemas.openxmlformats.org/presentationml/2006/main">
+<p:sld xmlns:a="http://schemas.openxmlformats.org/drawingml/2006/main" xmlns:r="http://schemas.openxmlformats.org/officeDocument/2006/relationships" xmlns:p="http://schemas.openxmlformats.org/presentationml/2006/main" show="0">
   <p:cSld>
     <p:spTree>
       <p:nvGrpSpPr>
@@ -21861,7 +21861,7 @@
 </file>
 
 <file path=ppt/slides/slide7.xml><?xml version="1.0" encoding="utf-8"?>
-<p:sld xmlns:a="http://schemas.openxmlformats.org/drawingml/2006/main" xmlns:r="http://schemas.openxmlformats.org/officeDocument/2006/relationships" xmlns:p="http://schemas.openxmlformats.org/presentationml/2006/main">
+<p:sld xmlns:a="http://schemas.openxmlformats.org/drawingml/2006/main" xmlns:r="http://schemas.openxmlformats.org/officeDocument/2006/relationships" xmlns:p="http://schemas.openxmlformats.org/presentationml/2006/main" show="0">
   <p:cSld>
     <p:spTree>
       <p:nvGrpSpPr>
@@ -22354,7 +22354,7 @@
 </file>
 
 <file path=ppt/slides/slide8.xml><?xml version="1.0" encoding="utf-8"?>
-<p:sld xmlns:a="http://schemas.openxmlformats.org/drawingml/2006/main" xmlns:r="http://schemas.openxmlformats.org/officeDocument/2006/relationships" xmlns:p="http://schemas.openxmlformats.org/presentationml/2006/main">
+<p:sld xmlns:a="http://schemas.openxmlformats.org/drawingml/2006/main" xmlns:r="http://schemas.openxmlformats.org/officeDocument/2006/relationships" xmlns:p="http://schemas.openxmlformats.org/presentationml/2006/main" show="0">
   <p:cSld>
     <p:spTree>
       <p:nvGrpSpPr>
@@ -22903,7 +22903,7 @@
 </file>
 
 <file path=ppt/slides/slide9.xml><?xml version="1.0" encoding="utf-8"?>
-<p:sld xmlns:a="http://schemas.openxmlformats.org/drawingml/2006/main" xmlns:r="http://schemas.openxmlformats.org/officeDocument/2006/relationships" xmlns:p="http://schemas.openxmlformats.org/presentationml/2006/main">
+<p:sld xmlns:a="http://schemas.openxmlformats.org/drawingml/2006/main" xmlns:r="http://schemas.openxmlformats.org/officeDocument/2006/relationships" xmlns:p="http://schemas.openxmlformats.org/presentationml/2006/main" show="0">
   <p:cSld>
     <p:spTree>
       <p:nvGrpSpPr>

</xml_diff>

<commit_message>
call not support '$' replace '.'
</commit_message>
<xml_diff>
--- a/DsDotNet/src/UnitTest/UnitTest.Model/ImportOfficeExample/Sample/s.pptx
+++ b/DsDotNet/src/UnitTest/UnitTest.Model/ImportOfficeExample/Sample/s.pptx
@@ -245,7 +245,7 @@
           <a:p>
             <a:fld id="{DD503887-5801-43A0-AEF9-041E8DDC2558}" type="datetimeFigureOut">
               <a:rPr lang="ko-KR" altLang="en-US" smtClean="0"/>
-              <a:t>2023-10-11</a:t>
+              <a:t>2023-11-05</a:t>
             </a:fld>
             <a:endParaRPr lang="ko-KR" altLang="en-US" dirty="0"/>
           </a:p>
@@ -422,7 +422,7 @@
           <a:p>
             <a:fld id="{95336A0E-57B1-4D4C-BD9B-2F72B5943464}" type="datetimeFigureOut">
               <a:rPr lang="ko-KR" altLang="en-US" smtClean="0"/>
-              <a:t>2023-10-11</a:t>
+              <a:t>2023-11-05</a:t>
             </a:fld>
             <a:endParaRPr lang="ko-KR" altLang="en-US" dirty="0"/>
           </a:p>
@@ -1095,7 +1095,7 @@
           <a:p>
             <a:fld id="{229D12C7-0FF5-4972-A033-474EFFC79F40}" type="datetime1">
               <a:rPr lang="ko-KR" altLang="en-US" smtClean="0"/>
-              <a:t>2023-10-11</a:t>
+              <a:t>2023-11-05</a:t>
             </a:fld>
             <a:endParaRPr lang="ko-KR" altLang="en-US" dirty="0"/>
           </a:p>
@@ -1293,7 +1293,7 @@
           <a:p>
             <a:fld id="{5BA19FD4-B052-4F56-8FD8-EAFD078DEFB0}" type="datetime1">
               <a:rPr lang="ko-KR" altLang="en-US" smtClean="0"/>
-              <a:t>2023-10-11</a:t>
+              <a:t>2023-11-05</a:t>
             </a:fld>
             <a:endParaRPr lang="ko-KR" altLang="en-US" dirty="0"/>
           </a:p>
@@ -1501,7 +1501,7 @@
           <a:p>
             <a:fld id="{024994B9-23A6-4B0A-A038-AC140E83DAA3}" type="datetime1">
               <a:rPr lang="ko-KR" altLang="en-US" smtClean="0"/>
-              <a:t>2023-10-11</a:t>
+              <a:t>2023-11-05</a:t>
             </a:fld>
             <a:endParaRPr lang="ko-KR" altLang="en-US" dirty="0"/>
           </a:p>
@@ -1643,7 +1643,7 @@
           <a:p>
             <a:fld id="{B5B1BBC2-B738-4C35-AEE5-660EB2DEB482}" type="datetime1">
               <a:rPr lang="ko-KR" altLang="en-US" smtClean="0"/>
-              <a:t>2023-10-11</a:t>
+              <a:t>2023-11-05</a:t>
             </a:fld>
             <a:endParaRPr lang="ko-KR" altLang="en-US" dirty="0"/>
           </a:p>
@@ -6310,7 +6310,7 @@
           <a:p>
             <a:fld id="{70D0DAB2-87CB-4028-B965-3AA710ADF2CB}" type="datetime1">
               <a:rPr lang="ko-KR" altLang="en-US" smtClean="0"/>
-              <a:t>2023-10-11</a:t>
+              <a:t>2023-11-05</a:t>
             </a:fld>
             <a:endParaRPr lang="ko-KR" altLang="en-US" dirty="0"/>
           </a:p>
@@ -6585,7 +6585,7 @@
           <a:p>
             <a:fld id="{63FA3D71-FEA8-477F-9D1E-EA860F411BC7}" type="datetime1">
               <a:rPr lang="ko-KR" altLang="en-US" smtClean="0"/>
-              <a:t>2023-10-11</a:t>
+              <a:t>2023-11-05</a:t>
             </a:fld>
             <a:endParaRPr lang="ko-KR" altLang="en-US" dirty="0"/>
           </a:p>
@@ -6850,7 +6850,7 @@
           <a:p>
             <a:fld id="{F58E3EF4-7980-4C97-BA64-EC66995BB574}" type="datetime1">
               <a:rPr lang="ko-KR" altLang="en-US" smtClean="0"/>
-              <a:t>2023-10-11</a:t>
+              <a:t>2023-11-05</a:t>
             </a:fld>
             <a:endParaRPr lang="ko-KR" altLang="en-US" dirty="0"/>
           </a:p>
@@ -7262,7 +7262,7 @@
           <a:p>
             <a:fld id="{FC9BC1D0-7D6B-4634-9D19-644040D74EAE}" type="datetime1">
               <a:rPr lang="ko-KR" altLang="en-US" smtClean="0"/>
-              <a:t>2023-10-11</a:t>
+              <a:t>2023-11-05</a:t>
             </a:fld>
             <a:endParaRPr lang="ko-KR" altLang="en-US" dirty="0"/>
           </a:p>
@@ -7403,7 +7403,7 @@
           <a:p>
             <a:fld id="{B5B1BBC2-B738-4C35-AEE5-660EB2DEB482}" type="datetime1">
               <a:rPr lang="ko-KR" altLang="en-US" smtClean="0"/>
-              <a:t>2023-10-11</a:t>
+              <a:t>2023-11-05</a:t>
             </a:fld>
             <a:endParaRPr lang="ko-KR" altLang="en-US" dirty="0"/>
           </a:p>
@@ -11985,7 +11985,7 @@
           <a:p>
             <a:fld id="{C60E9F93-7E77-4F36-B88C-A425F00C8D91}" type="datetime1">
               <a:rPr lang="ko-KR" altLang="en-US" smtClean="0"/>
-              <a:t>2023-10-11</a:t>
+              <a:t>2023-11-05</a:t>
             </a:fld>
             <a:endParaRPr lang="ko-KR" altLang="en-US" dirty="0"/>
           </a:p>
@@ -12296,7 +12296,7 @@
           <a:p>
             <a:fld id="{36BCCD0E-2A54-4016-BFFC-FEAABCDA6915}" type="datetime1">
               <a:rPr lang="ko-KR" altLang="en-US" smtClean="0"/>
-              <a:t>2023-10-11</a:t>
+              <a:t>2023-11-05</a:t>
             </a:fld>
             <a:endParaRPr lang="ko-KR" altLang="en-US" dirty="0"/>
           </a:p>
@@ -12584,7 +12584,7 @@
           <a:p>
             <a:fld id="{C984B0C4-64BA-4E4C-B5E6-A51EE3F6ED95}" type="datetime1">
               <a:rPr lang="ko-KR" altLang="en-US" smtClean="0"/>
-              <a:t>2023-10-11</a:t>
+              <a:t>2023-11-05</a:t>
             </a:fld>
             <a:endParaRPr lang="ko-KR" altLang="en-US" dirty="0"/>
           </a:p>
@@ -12826,7 +12826,7 @@
           <a:p>
             <a:fld id="{C984B0C4-64BA-4E4C-B5E6-A51EE3F6ED95}" type="datetime1">
               <a:rPr lang="ko-KR" altLang="en-US" smtClean="0"/>
-              <a:t>2023-10-11</a:t>
+              <a:t>2023-11-05</a:t>
             </a:fld>
             <a:endParaRPr lang="ko-KR" altLang="en-US" dirty="0"/>
           </a:p>
@@ -14423,7 +14423,7 @@
                 <a:pPr algn="ctr"/>
                 <a:r>
                   <a:rPr lang="en-US" altLang="ko-KR" sz="1050" dirty="0"/>
-                  <a:t>conv $MOVE</a:t>
+                  <a:t>conv .MOVE</a:t>
                 </a:r>
                 <a:endParaRPr lang="ko-KR" altLang="en-US" sz="1050" dirty="0"/>
               </a:p>
@@ -14479,7 +14479,7 @@
                 <a:pPr algn="ctr"/>
                 <a:r>
                   <a:rPr lang="en-US" altLang="ko-KR" sz="1050" dirty="0"/>
-                  <a:t>conv $REMOVE</a:t>
+                  <a:t>conv .REMOVE</a:t>
                 </a:r>
                 <a:endParaRPr lang="ko-KR" altLang="en-US" sz="1050" dirty="0"/>
               </a:p>
@@ -14540,7 +14540,7 @@
               </a:r>
               <a:r>
                 <a:rPr lang="en-US" altLang="ko-KR" sz="1050" dirty="0"/>
-                <a:t> $ADV</a:t>
+                <a:t> .ADV</a:t>
               </a:r>
               <a:endParaRPr lang="ko-KR" altLang="en-US" sz="1050" dirty="0"/>
             </a:p>
@@ -14600,7 +14600,7 @@
               </a:r>
               <a:r>
                 <a:rPr lang="en-US" altLang="ko-KR" sz="1050" dirty="0"/>
-                <a:t> $RET</a:t>
+                <a:t> .RET</a:t>
               </a:r>
               <a:endParaRPr lang="ko-KR" altLang="en-US" sz="1050" dirty="0"/>
             </a:p>
@@ -15720,7 +15720,7 @@
               <a:pPr algn="ctr"/>
               <a:r>
                 <a:rPr lang="en-US" altLang="ko-KR" sz="1050" dirty="0"/>
-                <a:t>Latch $ADV</a:t>
+                <a:t>Latch .ADV</a:t>
               </a:r>
               <a:endParaRPr lang="ko-KR" altLang="en-US" sz="1050" dirty="0"/>
             </a:p>
@@ -15776,7 +15776,7 @@
               <a:pPr algn="ctr"/>
               <a:r>
                 <a:rPr lang="en-US" altLang="ko-KR" sz="1050" dirty="0"/>
-                <a:t>Latch $RET</a:t>
+                <a:t>Latch .RET</a:t>
               </a:r>
               <a:endParaRPr lang="ko-KR" altLang="en-US" sz="1050" dirty="0"/>
             </a:p>
@@ -15946,7 +15946,7 @@
               <a:pPr algn="ctr"/>
               <a:r>
                 <a:rPr lang="en-US" altLang="ko-KR" sz="1050" dirty="0"/>
-                <a:t>Clamp $ADV</a:t>
+                <a:t>Clamp .ADV</a:t>
               </a:r>
               <a:endParaRPr lang="ko-KR" altLang="en-US" sz="1050" dirty="0"/>
             </a:p>
@@ -16002,7 +16002,7 @@
               <a:pPr algn="ctr"/>
               <a:r>
                 <a:rPr lang="en-US" altLang="ko-KR" sz="1050" dirty="0"/>
-                <a:t>Clamp $RET</a:t>
+                <a:t>Clamp .RET</a:t>
               </a:r>
               <a:endParaRPr lang="ko-KR" altLang="en-US" sz="1050" dirty="0"/>
             </a:p>
@@ -16269,7 +16269,7 @@
                 </a:r>
                 <a:r>
                   <a:rPr lang="en-US" altLang="ko-KR" sz="1050" dirty="0"/>
-                  <a:t> $ADV</a:t>
+                  <a:t> .ADV</a:t>
                 </a:r>
                 <a:endParaRPr lang="ko-KR" altLang="en-US" sz="1050" dirty="0"/>
               </a:p>
@@ -16329,7 +16329,7 @@
                 </a:r>
                 <a:r>
                   <a:rPr lang="en-US" altLang="ko-KR" sz="1050" dirty="0"/>
-                  <a:t> $RET</a:t>
+                  <a:t> .RET</a:t>
                 </a:r>
                 <a:endParaRPr lang="ko-KR" altLang="en-US" sz="1050" dirty="0"/>
               </a:p>
@@ -16433,7 +16433,7 @@
               </a:r>
               <a:r>
                 <a:rPr lang="en-US" altLang="ko-KR" sz="1050" dirty="0"/>
-                <a:t> $ADV</a:t>
+                <a:t> .ADV</a:t>
               </a:r>
               <a:endParaRPr lang="ko-KR" altLang="en-US" sz="1050" dirty="0"/>
             </a:p>
@@ -16493,7 +16493,7 @@
               </a:r>
               <a:r>
                 <a:rPr lang="en-US" altLang="ko-KR" sz="1050" dirty="0"/>
-                <a:t> $RET</a:t>
+                <a:t> .RET</a:t>
               </a:r>
               <a:endParaRPr lang="ko-KR" altLang="en-US" sz="1050" dirty="0"/>
             </a:p>
@@ -17494,7 +17494,7 @@
               <a:pPr algn="ctr"/>
               <a:r>
                 <a:rPr lang="en-US" altLang="ko-KR" sz="1050" dirty="0"/>
-                <a:t>Latch $ADV</a:t>
+                <a:t>Latch .ADV</a:t>
               </a:r>
               <a:endParaRPr lang="ko-KR" altLang="en-US" sz="1050" dirty="0"/>
             </a:p>
@@ -17550,7 +17550,7 @@
               <a:pPr algn="ctr"/>
               <a:r>
                 <a:rPr lang="en-US" altLang="ko-KR" sz="1050" dirty="0"/>
-                <a:t>Latch $RET</a:t>
+                <a:t>Latch .RET</a:t>
               </a:r>
               <a:endParaRPr lang="ko-KR" altLang="en-US" sz="1050" dirty="0"/>
             </a:p>
@@ -17720,7 +17720,7 @@
               <a:pPr algn="ctr"/>
               <a:r>
                 <a:rPr lang="en-US" altLang="ko-KR" sz="1050" dirty="0"/>
-                <a:t>Clamp $ADV</a:t>
+                <a:t>Clamp .ADV</a:t>
               </a:r>
               <a:endParaRPr lang="ko-KR" altLang="en-US" sz="1050" dirty="0"/>
             </a:p>
@@ -17776,7 +17776,7 @@
               <a:pPr algn="ctr"/>
               <a:r>
                 <a:rPr lang="en-US" altLang="ko-KR" sz="1050" dirty="0"/>
-                <a:t>Clamp $RET</a:t>
+                <a:t>Clamp .RET</a:t>
               </a:r>
               <a:endParaRPr lang="ko-KR" altLang="en-US" sz="1050" dirty="0"/>
             </a:p>
@@ -18043,7 +18043,7 @@
                 </a:r>
                 <a:r>
                   <a:rPr lang="en-US" altLang="ko-KR" sz="1050" dirty="0"/>
-                  <a:t> $ADV</a:t>
+                  <a:t> .ADV</a:t>
                 </a:r>
                 <a:endParaRPr lang="ko-KR" altLang="en-US" sz="1050" dirty="0"/>
               </a:p>
@@ -18103,7 +18103,7 @@
                 </a:r>
                 <a:r>
                   <a:rPr lang="en-US" altLang="ko-KR" sz="1050" dirty="0"/>
-                  <a:t> $RET</a:t>
+                  <a:t> .RET</a:t>
                 </a:r>
                 <a:endParaRPr lang="ko-KR" altLang="en-US" sz="1050" dirty="0"/>
               </a:p>
@@ -18207,7 +18207,7 @@
               </a:r>
               <a:r>
                 <a:rPr lang="en-US" altLang="ko-KR" sz="1050" dirty="0"/>
-                <a:t> $ADV</a:t>
+                <a:t> .ADV</a:t>
               </a:r>
               <a:endParaRPr lang="ko-KR" altLang="en-US" sz="1050" dirty="0"/>
             </a:p>
@@ -18267,7 +18267,7 @@
               </a:r>
               <a:r>
                 <a:rPr lang="en-US" altLang="ko-KR" sz="1050" dirty="0"/>
-                <a:t> $RET</a:t>
+                <a:t> .RET</a:t>
               </a:r>
               <a:endParaRPr lang="ko-KR" altLang="en-US" sz="1050" dirty="0"/>
             </a:p>
@@ -19268,7 +19268,7 @@
               <a:pPr algn="ctr"/>
               <a:r>
                 <a:rPr lang="en-US" altLang="ko-KR" sz="1050" dirty="0"/>
-                <a:t>Latch $ADV</a:t>
+                <a:t>Latch .ADV</a:t>
               </a:r>
               <a:endParaRPr lang="ko-KR" altLang="en-US" sz="1050" dirty="0"/>
             </a:p>
@@ -19324,7 +19324,7 @@
               <a:pPr algn="ctr"/>
               <a:r>
                 <a:rPr lang="en-US" altLang="ko-KR" sz="1050" dirty="0"/>
-                <a:t>Latch $RET</a:t>
+                <a:t>Latch .RET</a:t>
               </a:r>
               <a:endParaRPr lang="ko-KR" altLang="en-US" sz="1050" dirty="0"/>
             </a:p>
@@ -19494,7 +19494,7 @@
               <a:pPr algn="ctr"/>
               <a:r>
                 <a:rPr lang="en-US" altLang="ko-KR" sz="1050" dirty="0"/>
-                <a:t>Clamp $ADV</a:t>
+                <a:t>Clamp .ADV</a:t>
               </a:r>
               <a:endParaRPr lang="ko-KR" altLang="en-US" sz="1050" dirty="0"/>
             </a:p>
@@ -19550,7 +19550,7 @@
               <a:pPr algn="ctr"/>
               <a:r>
                 <a:rPr lang="en-US" altLang="ko-KR" sz="1050" dirty="0"/>
-                <a:t>Clamp $RET</a:t>
+                <a:t>Clamp .RET</a:t>
               </a:r>
               <a:endParaRPr lang="ko-KR" altLang="en-US" sz="1050" dirty="0"/>
             </a:p>
@@ -19817,7 +19817,7 @@
                 </a:r>
                 <a:r>
                   <a:rPr lang="en-US" altLang="ko-KR" sz="1050" dirty="0"/>
-                  <a:t> $ADV</a:t>
+                  <a:t> .ADV</a:t>
                 </a:r>
                 <a:endParaRPr lang="ko-KR" altLang="en-US" sz="1050" dirty="0"/>
               </a:p>
@@ -19877,7 +19877,7 @@
                 </a:r>
                 <a:r>
                   <a:rPr lang="en-US" altLang="ko-KR" sz="1050" dirty="0"/>
-                  <a:t> $RET</a:t>
+                  <a:t> .RET</a:t>
                 </a:r>
                 <a:endParaRPr lang="ko-KR" altLang="en-US" sz="1050" dirty="0"/>
               </a:p>
@@ -19981,7 +19981,7 @@
               </a:r>
               <a:r>
                 <a:rPr lang="en-US" altLang="ko-KR" sz="1050" dirty="0"/>
-                <a:t> $ADV</a:t>
+                <a:t> .ADV</a:t>
               </a:r>
               <a:endParaRPr lang="ko-KR" altLang="en-US" sz="1050" dirty="0"/>
             </a:p>
@@ -20041,7 +20041,7 @@
               </a:r>
               <a:r>
                 <a:rPr lang="en-US" altLang="ko-KR" sz="1050" dirty="0"/>
-                <a:t> $RET</a:t>
+                <a:t> .RET</a:t>
               </a:r>
               <a:endParaRPr lang="ko-KR" altLang="en-US" sz="1050" dirty="0"/>
             </a:p>
@@ -21042,7 +21042,7 @@
               <a:pPr algn="ctr"/>
               <a:r>
                 <a:rPr lang="en-US" altLang="ko-KR" sz="1050" dirty="0"/>
-                <a:t>Latch $ADV</a:t>
+                <a:t>Latch .ADV</a:t>
               </a:r>
               <a:endParaRPr lang="ko-KR" altLang="en-US" sz="1050" dirty="0"/>
             </a:p>
@@ -21098,7 +21098,7 @@
               <a:pPr algn="ctr"/>
               <a:r>
                 <a:rPr lang="en-US" altLang="ko-KR" sz="1050" dirty="0"/>
-                <a:t>Latch $RET</a:t>
+                <a:t>Latch .RET</a:t>
               </a:r>
               <a:endParaRPr lang="ko-KR" altLang="en-US" sz="1050" dirty="0"/>
             </a:p>
@@ -21268,7 +21268,7 @@
               <a:pPr algn="ctr"/>
               <a:r>
                 <a:rPr lang="en-US" altLang="ko-KR" sz="1050" dirty="0"/>
-                <a:t>Clamp $ADV</a:t>
+                <a:t>Clamp .ADV</a:t>
               </a:r>
               <a:endParaRPr lang="ko-KR" altLang="en-US" sz="1050" dirty="0"/>
             </a:p>
@@ -21324,7 +21324,7 @@
               <a:pPr algn="ctr"/>
               <a:r>
                 <a:rPr lang="en-US" altLang="ko-KR" sz="1050" dirty="0"/>
-                <a:t>Clamp $RET</a:t>
+                <a:t>Clamp .RET</a:t>
               </a:r>
               <a:endParaRPr lang="ko-KR" altLang="en-US" sz="1050" dirty="0"/>
             </a:p>
@@ -21591,7 +21591,7 @@
                 </a:r>
                 <a:r>
                   <a:rPr lang="en-US" altLang="ko-KR" sz="1050" dirty="0"/>
-                  <a:t> $ADV</a:t>
+                  <a:t> .ADV</a:t>
                 </a:r>
                 <a:endParaRPr lang="ko-KR" altLang="en-US" sz="1050" dirty="0"/>
               </a:p>
@@ -21651,7 +21651,7 @@
                 </a:r>
                 <a:r>
                   <a:rPr lang="en-US" altLang="ko-KR" sz="1050" dirty="0"/>
-                  <a:t> $RET</a:t>
+                  <a:t> .RET</a:t>
                 </a:r>
                 <a:endParaRPr lang="ko-KR" altLang="en-US" sz="1050" dirty="0"/>
               </a:p>
@@ -21755,7 +21755,7 @@
               </a:r>
               <a:r>
                 <a:rPr lang="en-US" altLang="ko-KR" sz="1050" dirty="0"/>
-                <a:t> $ADV</a:t>
+                <a:t> .ADV</a:t>
               </a:r>
               <a:endParaRPr lang="ko-KR" altLang="en-US" sz="1050" dirty="0"/>
             </a:p>
@@ -21815,7 +21815,7 @@
               </a:r>
               <a:r>
                 <a:rPr lang="en-US" altLang="ko-KR" sz="1050" dirty="0"/>
-                <a:t> $RET</a:t>
+                <a:t> .RET</a:t>
               </a:r>
               <a:endParaRPr lang="ko-KR" altLang="en-US" sz="1050" dirty="0"/>
             </a:p>
@@ -22816,7 +22816,7 @@
               <a:pPr algn="ctr"/>
               <a:r>
                 <a:rPr lang="en-US" altLang="ko-KR" sz="1050" dirty="0"/>
-                <a:t>Latch $ADV</a:t>
+                <a:t>Latch .ADV</a:t>
               </a:r>
               <a:endParaRPr lang="ko-KR" altLang="en-US" sz="1050" dirty="0"/>
             </a:p>
@@ -22872,7 +22872,7 @@
               <a:pPr algn="ctr"/>
               <a:r>
                 <a:rPr lang="en-US" altLang="ko-KR" sz="1050" dirty="0"/>
-                <a:t>Latch $RET</a:t>
+                <a:t>Latch .RET</a:t>
               </a:r>
               <a:endParaRPr lang="ko-KR" altLang="en-US" sz="1050" dirty="0"/>
             </a:p>
@@ -23042,7 +23042,7 @@
               <a:pPr algn="ctr"/>
               <a:r>
                 <a:rPr lang="en-US" altLang="ko-KR" sz="1050" dirty="0"/>
-                <a:t>Clamp $ADV</a:t>
+                <a:t>Clamp .ADV</a:t>
               </a:r>
               <a:endParaRPr lang="ko-KR" altLang="en-US" sz="1050" dirty="0"/>
             </a:p>
@@ -23098,7 +23098,7 @@
               <a:pPr algn="ctr"/>
               <a:r>
                 <a:rPr lang="en-US" altLang="ko-KR" sz="1050" dirty="0"/>
-                <a:t>Clamp $RET</a:t>
+                <a:t>Clamp .RET</a:t>
               </a:r>
               <a:endParaRPr lang="ko-KR" altLang="en-US" sz="1050" dirty="0"/>
             </a:p>
@@ -23365,7 +23365,7 @@
                 </a:r>
                 <a:r>
                   <a:rPr lang="en-US" altLang="ko-KR" sz="1050" dirty="0"/>
-                  <a:t> $ADV</a:t>
+                  <a:t> .ADV</a:t>
                 </a:r>
                 <a:endParaRPr lang="ko-KR" altLang="en-US" sz="1050" dirty="0"/>
               </a:p>
@@ -23425,7 +23425,7 @@
                 </a:r>
                 <a:r>
                   <a:rPr lang="en-US" altLang="ko-KR" sz="1050" dirty="0"/>
-                  <a:t> $RET</a:t>
+                  <a:t> .RET</a:t>
                 </a:r>
                 <a:endParaRPr lang="ko-KR" altLang="en-US" sz="1050" dirty="0"/>
               </a:p>
@@ -23529,7 +23529,7 @@
               </a:r>
               <a:r>
                 <a:rPr lang="en-US" altLang="ko-KR" sz="1050" dirty="0"/>
-                <a:t> $ADV</a:t>
+                <a:t> .ADV</a:t>
               </a:r>
               <a:endParaRPr lang="ko-KR" altLang="en-US" sz="1050" dirty="0"/>
             </a:p>
@@ -23589,7 +23589,7 @@
               </a:r>
               <a:r>
                 <a:rPr lang="en-US" altLang="ko-KR" sz="1050" dirty="0"/>
-                <a:t> $RET</a:t>
+                <a:t> .RET</a:t>
               </a:r>
               <a:endParaRPr lang="ko-KR" altLang="en-US" sz="1050" dirty="0"/>
             </a:p>
@@ -27620,7 +27620,7 @@
                 <a:pPr algn="ctr"/>
                 <a:r>
                   <a:rPr lang="en-US" altLang="ko-KR" dirty="0"/>
-                  <a:t>Pin $ADV</a:t>
+                  <a:t>Pin .ADV</a:t>
                 </a:r>
                 <a:endParaRPr lang="ko-KR" altLang="en-US" dirty="0"/>
               </a:p>
@@ -27676,7 +27676,7 @@
                 <a:pPr algn="ctr"/>
                 <a:r>
                   <a:rPr lang="en-US" altLang="ko-KR" dirty="0"/>
-                  <a:t>Pin $RET</a:t>
+                  <a:t>Pin .RET</a:t>
                 </a:r>
                 <a:endParaRPr lang="ko-KR" altLang="en-US" dirty="0"/>
               </a:p>
@@ -27756,7 +27756,7 @@
           <a:p>
             <a:r>
               <a:rPr lang="en-US" altLang="ko-KR" dirty="0"/>
-              <a:t>Loading Name $ Api </a:t>
+              <a:t>Loading Name . Api </a:t>
             </a:r>
           </a:p>
           <a:p>
@@ -27774,7 +27774,7 @@
             </a:r>
             <a:r>
               <a:rPr lang="en-US" altLang="ko-KR" dirty="0"/>
-              <a:t>’$ ‘ </a:t>
+              <a:t>’. ‘ </a:t>
             </a:r>
             <a:r>
               <a:rPr lang="ko-KR" altLang="en-US" dirty="0"/>
@@ -28168,12 +28168,8 @@
               <a:p>
                 <a:pPr algn="ctr"/>
                 <a:r>
-                  <a:rPr lang="en-US" altLang="ko-KR" dirty="0" err="1"/>
-                  <a:t>Copy1</a:t>
-                </a:r>
-                <a:r>
                   <a:rPr lang="en-US" altLang="ko-KR" dirty="0"/>
-                  <a:t> $ADV</a:t>
+                  <a:t>Copy1 .ADV</a:t>
                 </a:r>
                 <a:endParaRPr lang="ko-KR" altLang="en-US" dirty="0"/>
               </a:p>
@@ -28228,12 +28224,8 @@
               <a:p>
                 <a:pPr algn="ctr"/>
                 <a:r>
-                  <a:rPr lang="en-US" altLang="ko-KR" dirty="0" err="1"/>
-                  <a:t>Copy2</a:t>
-                </a:r>
-                <a:r>
                   <a:rPr lang="en-US" altLang="ko-KR" dirty="0"/>
-                  <a:t> $RET</a:t>
+                  <a:t>Copy2 .RET</a:t>
                 </a:r>
                 <a:endParaRPr lang="ko-KR" altLang="en-US" dirty="0"/>
               </a:p>
@@ -28750,7 +28742,7 @@
                 <a:pPr algn="ctr"/>
                 <a:r>
                   <a:rPr lang="en-US" altLang="ko-KR" dirty="0"/>
-                  <a:t>Job $Func1</a:t>
+                  <a:t>Job .Func1</a:t>
                 </a:r>
                 <a:endParaRPr lang="ko-KR" altLang="en-US" dirty="0"/>
               </a:p>
@@ -28806,7 +28798,7 @@
                 <a:pPr algn="ctr"/>
                 <a:r>
                   <a:rPr lang="en-US" altLang="ko-KR" dirty="0"/>
-                  <a:t>Job $Func2</a:t>
+                  <a:t>Job .Func2</a:t>
                 </a:r>
                 <a:endParaRPr lang="ko-KR" altLang="en-US" dirty="0"/>
               </a:p>
@@ -29299,7 +29291,7 @@
                 </a:r>
                 <a:r>
                   <a:rPr lang="en-US" altLang="ko-KR" dirty="0"/>
-                  <a:t> $HOME</a:t>
+                  <a:t> .HOME</a:t>
                 </a:r>
                 <a:endParaRPr lang="ko-KR" altLang="en-US" dirty="0"/>
               </a:p>
@@ -29359,7 +29351,7 @@
                 </a:r>
                 <a:r>
                   <a:rPr lang="en-US" altLang="ko-KR" dirty="0"/>
-                  <a:t> $RESET</a:t>
+                  <a:t> .RESET</a:t>
                 </a:r>
                 <a:endParaRPr lang="ko-KR" altLang="en-US" dirty="0"/>
               </a:p>
@@ -29419,7 +29411,7 @@
                 </a:r>
                 <a:r>
                   <a:rPr lang="en-US" altLang="ko-KR" dirty="0"/>
-                  <a:t> $WELD</a:t>
+                  <a:t> .WELD</a:t>
                 </a:r>
                 <a:endParaRPr lang="ko-KR" altLang="en-US" dirty="0"/>
               </a:p>
@@ -30145,7 +30137,7 @@
           <a:p>
             <a:r>
               <a:rPr lang="en-US" altLang="ko-KR" dirty="0"/>
-              <a:t>$SystemA</a:t>
+              <a:t>.SystemA</a:t>
             </a:r>
             <a:endParaRPr lang="ko-KR" altLang="en-US" dirty="0"/>
           </a:p>
@@ -33673,7 +33665,7 @@
               <a:pPr algn="ctr"/>
               <a:r>
                 <a:rPr lang="en-US" altLang="ko-KR" sz="1050" dirty="0"/>
-                <a:t>Latch $ADV</a:t>
+                <a:t>Latch .ADV</a:t>
               </a:r>
               <a:endParaRPr lang="ko-KR" altLang="en-US" sz="1050" dirty="0"/>
             </a:p>
@@ -33729,7 +33721,7 @@
               <a:pPr algn="ctr"/>
               <a:r>
                 <a:rPr lang="en-US" altLang="ko-KR" sz="1050" dirty="0"/>
-                <a:t>Latch $RET</a:t>
+                <a:t>Latch .RET</a:t>
               </a:r>
               <a:endParaRPr lang="ko-KR" altLang="en-US" sz="1050" dirty="0"/>
             </a:p>
@@ -33899,7 +33891,7 @@
               <a:pPr algn="ctr"/>
               <a:r>
                 <a:rPr lang="en-US" altLang="ko-KR" sz="1050" dirty="0"/>
-                <a:t>Clamp $ADV</a:t>
+                <a:t>Clamp .ADV</a:t>
               </a:r>
               <a:endParaRPr lang="ko-KR" altLang="en-US" sz="1050" dirty="0"/>
             </a:p>
@@ -33955,7 +33947,7 @@
               <a:pPr algn="ctr"/>
               <a:r>
                 <a:rPr lang="en-US" altLang="ko-KR" sz="1050" dirty="0"/>
-                <a:t>Clamp $RET</a:t>
+                <a:t>Clamp .RET</a:t>
               </a:r>
               <a:endParaRPr lang="ko-KR" altLang="en-US" sz="1050" dirty="0"/>
             </a:p>
@@ -34222,7 +34214,7 @@
                 </a:r>
                 <a:r>
                   <a:rPr lang="en-US" altLang="ko-KR" sz="1050" dirty="0"/>
-                  <a:t> $ADV</a:t>
+                  <a:t> .ADV</a:t>
                 </a:r>
                 <a:endParaRPr lang="ko-KR" altLang="en-US" sz="1050" dirty="0"/>
               </a:p>
@@ -34282,7 +34274,7 @@
                 </a:r>
                 <a:r>
                   <a:rPr lang="en-US" altLang="ko-KR" sz="1050" dirty="0"/>
-                  <a:t> $RET</a:t>
+                  <a:t> .RET</a:t>
                 </a:r>
                 <a:endParaRPr lang="ko-KR" altLang="en-US" sz="1050" dirty="0"/>
               </a:p>
@@ -34386,7 +34378,7 @@
               </a:r>
               <a:r>
                 <a:rPr lang="en-US" altLang="ko-KR" sz="1050" dirty="0"/>
-                <a:t> $ADV</a:t>
+                <a:t> .ADV</a:t>
               </a:r>
               <a:endParaRPr lang="ko-KR" altLang="en-US" sz="1050" dirty="0"/>
             </a:p>
@@ -34446,7 +34438,7 @@
               </a:r>
               <a:r>
                 <a:rPr lang="en-US" altLang="ko-KR" sz="1050" dirty="0"/>
-                <a:t> $RET</a:t>
+                <a:t> .RET</a:t>
               </a:r>
               <a:endParaRPr lang="ko-KR" altLang="en-US" sz="1050" dirty="0"/>
             </a:p>
@@ -34770,7 +34762,7 @@
               <a:pPr algn="ctr"/>
               <a:r>
                 <a:rPr lang="en-US" altLang="ko-KR" sz="1000" dirty="0"/>
-                <a:t>$ADV</a:t>
+                <a:t>.ADV</a:t>
               </a:r>
               <a:endParaRPr lang="ko-KR" altLang="en-US" sz="1000" dirty="0"/>
             </a:p>
@@ -34827,7 +34819,7 @@
               <a:pPr algn="ctr"/>
               <a:r>
                 <a:rPr lang="en-US" altLang="ko-KR" sz="1000" dirty="0"/>
-                <a:t>$RET</a:t>
+                <a:t>.RET</a:t>
               </a:r>
               <a:endParaRPr lang="ko-KR" altLang="en-US" sz="1000" dirty="0"/>
             </a:p>
@@ -35261,7 +35253,7 @@
               <a:pPr algn="ctr"/>
               <a:r>
                 <a:rPr lang="en-US" altLang="ko-KR" sz="1000" dirty="0"/>
-                <a:t>$ADV</a:t>
+                <a:t>.ADV</a:t>
               </a:r>
               <a:endParaRPr lang="ko-KR" altLang="en-US" sz="1000" dirty="0"/>
             </a:p>
@@ -35318,7 +35310,7 @@
               <a:pPr algn="ctr"/>
               <a:r>
                 <a:rPr lang="en-US" altLang="ko-KR" sz="1000" dirty="0"/>
-                <a:t>$RET</a:t>
+                <a:t>.RET</a:t>
               </a:r>
               <a:endParaRPr lang="ko-KR" altLang="en-US" sz="1000" dirty="0"/>
             </a:p>
@@ -35418,11 +35410,7 @@
             <a:pPr algn="ctr"/>
             <a:r>
               <a:rPr lang="en-US" altLang="ko-KR" dirty="0"/>
-              <a:t>$</a:t>
-            </a:r>
-            <a:r>
-              <a:rPr lang="en-US" altLang="ko-KR" dirty="0" err="1"/>
-              <a:t>API1</a:t>
+              <a:t>.API1</a:t>
             </a:r>
             <a:endParaRPr lang="ko-KR" altLang="en-US" dirty="0"/>
           </a:p>
@@ -36530,7 +36518,7 @@
                 <a:pPr algn="ctr"/>
                 <a:r>
                   <a:rPr lang="en-US" altLang="ko-KR" sz="1050" dirty="0"/>
-                  <a:t>Pin $ADV</a:t>
+                  <a:t>Pin .ADV</a:t>
                 </a:r>
                 <a:endParaRPr lang="ko-KR" altLang="en-US" sz="1050" dirty="0"/>
               </a:p>
@@ -36586,7 +36574,7 @@
                 <a:pPr algn="ctr"/>
                 <a:r>
                   <a:rPr lang="en-US" altLang="ko-KR" sz="1050" dirty="0"/>
-                  <a:t>Pin $RET</a:t>
+                  <a:t>Pin .RET</a:t>
                 </a:r>
                 <a:endParaRPr lang="ko-KR" altLang="en-US" sz="1050" dirty="0"/>
               </a:p>

</xml_diff>